<commit_message>
serve pdf file correctly
</commit_message>
<xml_diff>
--- a/pennapps-ruby-workshop.pptx
+++ b/pennapps-ruby-workshop.pptx
@@ -749,6 +749,90 @@
           <a:bodyPr/>
           <a:lstStyle/>
           <a:p>
+            <a:fld id="{83983432-4A10-594C-BA1A-6337BBB178BC}" type="slidenum">
+              <a:rPr lang="en-US" smtClean="0"/>
+              <a:t>1</a:t>
+            </a:fld>
+            <a:endParaRPr lang="en-US"/>
+          </a:p>
+        </p:txBody>
+      </p:sp>
+    </p:spTree>
+    <p:extLst>
+      <p:ext uri="{BB962C8B-B14F-4D97-AF65-F5344CB8AC3E}">
+        <p14:creationId xmlns:p14="http://schemas.microsoft.com/office/powerpoint/2010/main" val="1347585516"/>
+      </p:ext>
+    </p:extLst>
+  </p:cSld>
+  <p:clrMapOvr>
+    <a:masterClrMapping/>
+  </p:clrMapOvr>
+</p:notes>
+</file>
+
+<file path=ppt/notesSlides/notesSlide2.xml><?xml version="1.0" encoding="utf-8"?>
+<p:notes xmlns:a="http://schemas.openxmlformats.org/drawingml/2006/main" xmlns:r="http://schemas.openxmlformats.org/officeDocument/2006/relationships" xmlns:p="http://schemas.openxmlformats.org/presentationml/2006/main">
+  <p:cSld>
+    <p:spTree>
+      <p:nvGrpSpPr>
+        <p:cNvPr id="1" name=""/>
+        <p:cNvGrpSpPr/>
+        <p:nvPr/>
+      </p:nvGrpSpPr>
+      <p:grpSpPr>
+        <a:xfrm>
+          <a:off x="0" y="0"/>
+          <a:ext cx="0" cy="0"/>
+          <a:chOff x="0" y="0"/>
+          <a:chExt cx="0" cy="0"/>
+        </a:xfrm>
+      </p:grpSpPr>
+      <p:sp>
+        <p:nvSpPr>
+          <p:cNvPr id="2" name="Slide Image Placeholder 1"/>
+          <p:cNvSpPr>
+            <a:spLocks noGrp="1" noRot="1" noChangeAspect="1"/>
+          </p:cNvSpPr>
+          <p:nvPr>
+            <p:ph type="sldImg"/>
+          </p:nvPr>
+        </p:nvSpPr>
+        <p:spPr/>
+      </p:sp>
+      <p:sp>
+        <p:nvSpPr>
+          <p:cNvPr id="3" name="Notes Placeholder 2"/>
+          <p:cNvSpPr>
+            <a:spLocks noGrp="1"/>
+          </p:cNvSpPr>
+          <p:nvPr>
+            <p:ph type="body" idx="1"/>
+          </p:nvPr>
+        </p:nvSpPr>
+        <p:spPr/>
+        <p:txBody>
+          <a:bodyPr/>
+          <a:lstStyle/>
+          <a:p>
+            <a:endParaRPr lang="en-US"/>
+          </a:p>
+        </p:txBody>
+      </p:sp>
+      <p:sp>
+        <p:nvSpPr>
+          <p:cNvPr id="4" name="Slide Number Placeholder 3"/>
+          <p:cNvSpPr>
+            <a:spLocks noGrp="1"/>
+          </p:cNvSpPr>
+          <p:nvPr>
+            <p:ph type="sldNum" sz="quarter" idx="10"/>
+          </p:nvPr>
+        </p:nvSpPr>
+        <p:spPr/>
+        <p:txBody>
+          <a:bodyPr/>
+          <a:lstStyle/>
+          <a:p>
             <a:fld id="{F71C1556-6F8E-5B44-860C-24B72CE77919}" type="slidenum">
               <a:rPr lang="en-US" smtClean="0"/>
               <a:t>2</a:t>
@@ -949,7 +1033,7 @@
           <a:bodyPr/>
           <a:lstStyle/>
           <a:p>
-            <a:fld id="{CB870AF5-0447-FA48-A893-8C4BD62A4FD8}" type="datetime1">
+            <a:fld id="{3777BB69-1B21-CF4A-9B98-4646B2CAB2C7}" type="datetime1">
               <a:rPr lang="en-US" smtClean="0"/>
               <a:t>9/9/16</a:t>
             </a:fld>
@@ -1123,7 +1207,7 @@
           <a:bodyPr/>
           <a:lstStyle/>
           <a:p>
-            <a:fld id="{80388313-88C5-454D-B367-C3104DD59A60}" type="datetime1">
+            <a:fld id="{0010CDE3-5BF5-7140-BA9D-B1A26FB597B4}" type="datetime1">
               <a:rPr lang="en-US" smtClean="0"/>
               <a:t>9/9/16</a:t>
             </a:fld>
@@ -1307,7 +1391,7 @@
           <a:bodyPr/>
           <a:lstStyle/>
           <a:p>
-            <a:fld id="{D6B9487B-4871-5F4C-BEF4-552DA10E5CD1}" type="datetime1">
+            <a:fld id="{BC18B3F1-5D49-1A48-AE82-E2C3BE9F2E9A}" type="datetime1">
               <a:rPr lang="en-US" smtClean="0"/>
               <a:t>9/9/16</a:t>
             </a:fld>
@@ -1481,7 +1565,7 @@
           <a:bodyPr/>
           <a:lstStyle/>
           <a:p>
-            <a:fld id="{7D251E80-E2E3-A841-B2E1-35D7EA42FE6E}" type="datetime1">
+            <a:fld id="{E13B6885-4DEF-1F4E-81AA-085F131E92BA}" type="datetime1">
               <a:rPr lang="en-US" smtClean="0"/>
               <a:t>9/9/16</a:t>
             </a:fld>
@@ -1731,7 +1815,7 @@
           <a:bodyPr/>
           <a:lstStyle/>
           <a:p>
-            <a:fld id="{4A42C897-BC7F-1D49-904E-5794E7309995}" type="datetime1">
+            <a:fld id="{3BD7186A-33CB-2944-A1A7-D86B4862D171}" type="datetime1">
               <a:rPr lang="en-US" smtClean="0"/>
               <a:t>9/9/16</a:t>
             </a:fld>
@@ -2023,7 +2107,7 @@
           <a:bodyPr/>
           <a:lstStyle/>
           <a:p>
-            <a:fld id="{CB6DAB60-600C-824F-B1EA-01BB807DE3E6}" type="datetime1">
+            <a:fld id="{C8EC4B96-31B4-F242-8C61-F7FE8661C9B1}" type="datetime1">
               <a:rPr lang="en-US" smtClean="0"/>
               <a:t>9/9/16</a:t>
             </a:fld>
@@ -2449,7 +2533,7 @@
           <a:bodyPr/>
           <a:lstStyle/>
           <a:p>
-            <a:fld id="{FE7ED753-4AB9-7349-8BD3-17A53293781A}" type="datetime1">
+            <a:fld id="{6EC9130F-EBAA-4A49-9F49-200AD6F74581}" type="datetime1">
               <a:rPr lang="en-US" smtClean="0"/>
               <a:t>9/9/16</a:t>
             </a:fld>
@@ -2571,7 +2655,7 @@
           <a:bodyPr/>
           <a:lstStyle/>
           <a:p>
-            <a:fld id="{B64A8725-2C1D-6A4C-9B49-B56272F5E380}" type="datetime1">
+            <a:fld id="{36036F16-00FC-174E-AD37-9BE195525A11}" type="datetime1">
               <a:rPr lang="en-US" smtClean="0"/>
               <a:t>9/9/16</a:t>
             </a:fld>
@@ -2670,7 +2754,7 @@
           <a:bodyPr/>
           <a:lstStyle/>
           <a:p>
-            <a:fld id="{D2BD97EC-25BA-224F-B6B9-5C01D7AB0FFC}" type="datetime1">
+            <a:fld id="{487407DB-422C-214A-8080-09334DE0FCB0}" type="datetime1">
               <a:rPr lang="en-US" smtClean="0"/>
               <a:t>9/9/16</a:t>
             </a:fld>
@@ -2951,7 +3035,7 @@
           <a:bodyPr/>
           <a:lstStyle/>
           <a:p>
-            <a:fld id="{481A8F79-CA78-F14B-B40F-8F8042ED797A}" type="datetime1">
+            <a:fld id="{22B06FB9-3A7B-8647-BC83-2222D7F915FE}" type="datetime1">
               <a:rPr lang="en-US" smtClean="0"/>
               <a:t>9/9/16</a:t>
             </a:fld>
@@ -3212,7 +3296,7 @@
           <a:bodyPr/>
           <a:lstStyle/>
           <a:p>
-            <a:fld id="{A90F6417-3B1C-CC49-98A0-428EFE8A2EC8}" type="datetime1">
+            <a:fld id="{24876213-DC0D-BE44-A06E-AE4DF4969AF2}" type="datetime1">
               <a:rPr lang="en-US" smtClean="0"/>
               <a:t>9/9/16</a:t>
             </a:fld>
@@ -3429,7 +3513,7 @@
             </a:lvl1pPr>
           </a:lstStyle>
           <a:p>
-            <a:fld id="{E102607D-6528-E648-89F2-84A5B27356EA}" type="datetime1">
+            <a:fld id="{539F888F-FA39-9C45-890B-9BD9FABFF8DF}" type="datetime1">
               <a:rPr lang="en-US" smtClean="0"/>
               <a:t>9/9/16</a:t>
             </a:fld>
@@ -3891,7 +3975,7 @@
           <p:nvPr/>
         </p:nvPicPr>
         <p:blipFill>
-          <a:blip r:embed="rId2">
+          <a:blip r:embed="rId3">
             <a:extLst>
               <a:ext uri="{28A0092B-C50C-407E-A947-70E740481C1C}">
                 <a14:useLocalDpi xmlns:a14="http://schemas.microsoft.com/office/drawing/2010/main" val="0"/>
@@ -4078,7 +4162,7 @@
           <a:p>
             <a:r>
               <a:rPr lang="de-DE" smtClean="0"/>
-              <a:t>CIS 196 Fall 2016</a:t>
+              <a:t>PennApps Ruby Workshop</a:t>
             </a:r>
             <a:endParaRPr lang="en-US"/>
           </a:p>
@@ -4639,7 +4723,7 @@
           <a:p>
             <a:r>
               <a:rPr lang="de-DE" smtClean="0"/>
-              <a:t>CIS 196 Fall 2016</a:t>
+              <a:t>PennApps Ruby Workshop</a:t>
             </a:r>
             <a:endParaRPr lang="en-US"/>
           </a:p>
@@ -5115,7 +5199,7 @@
           <a:p>
             <a:r>
               <a:rPr lang="de-DE" smtClean="0"/>
-              <a:t>CIS 196 Fall 2016</a:t>
+              <a:t>PennApps Ruby Workshop</a:t>
             </a:r>
             <a:endParaRPr lang="en-US"/>
           </a:p>
@@ -5656,7 +5740,7 @@
           <a:p>
             <a:r>
               <a:rPr lang="de-DE" smtClean="0"/>
-              <a:t>CIS 196 Fall 2016</a:t>
+              <a:t>PennApps Ruby Workshop</a:t>
             </a:r>
             <a:endParaRPr lang="en-US"/>
           </a:p>
@@ -7447,7 +7531,7 @@
           <a:p>
             <a:r>
               <a:rPr lang="de-DE" smtClean="0"/>
-              <a:t>CIS 196 Fall 2016</a:t>
+              <a:t>PennApps Ruby Workshop</a:t>
             </a:r>
             <a:endParaRPr lang="en-US"/>
           </a:p>
@@ -10482,7 +10566,7 @@
           <a:p>
             <a:r>
               <a:rPr lang="de-DE" smtClean="0"/>
-              <a:t>CIS 196 Fall 2016</a:t>
+              <a:t>PennApps Ruby Workshop</a:t>
             </a:r>
             <a:endParaRPr lang="en-US"/>
           </a:p>
@@ -15878,7 +15962,7 @@
           <a:p>
             <a:r>
               <a:rPr lang="de-DE" smtClean="0"/>
-              <a:t>CIS 196 Fall 2016</a:t>
+              <a:t>PennApps Ruby Workshop</a:t>
             </a:r>
             <a:endParaRPr lang="en-US"/>
           </a:p>
@@ -16174,7 +16258,7 @@
           <a:p>
             <a:r>
               <a:rPr lang="de-DE" smtClean="0"/>
-              <a:t>CIS 196 Fall 2016</a:t>
+              <a:t>PennApps Ruby Workshop</a:t>
             </a:r>
             <a:endParaRPr lang="en-US"/>
           </a:p>
@@ -16715,7 +16799,7 @@
           <a:p>
             <a:r>
               <a:rPr lang="de-DE" smtClean="0"/>
-              <a:t>CIS 196 Fall 2016</a:t>
+              <a:t>PennApps Ruby Workshop</a:t>
             </a:r>
             <a:endParaRPr lang="en-US"/>
           </a:p>
@@ -16876,7 +16960,7 @@
           <a:p>
             <a:r>
               <a:rPr lang="de-DE" smtClean="0"/>
-              <a:t>CIS 196 Fall 2016</a:t>
+              <a:t>PennApps Ruby Workshop</a:t>
             </a:r>
             <a:endParaRPr lang="en-US"/>
           </a:p>
@@ -17470,7 +17554,7 @@
           <a:p>
             <a:r>
               <a:rPr lang="de-DE" smtClean="0"/>
-              <a:t>CIS 196 Fall 2016</a:t>
+              <a:t>PennApps Ruby Workshop</a:t>
             </a:r>
             <a:endParaRPr lang="en-US"/>
           </a:p>

</xml_diff>

<commit_message>
update header to have link to pdf
</commit_message>
<xml_diff>
--- a/pennapps-ruby-workshop.pptx
+++ b/pennapps-ruby-workshop.pptx
@@ -251,7 +251,7 @@
           <a:p>
             <a:fld id="{B06E1C6C-4C99-B941-A033-2F233E88372B}" type="datetimeFigureOut">
               <a:rPr lang="en-US" smtClean="0"/>
-              <a:t>9/9/16</a:t>
+              <a:t>9/10/16</a:t>
             </a:fld>
             <a:endParaRPr lang="en-US"/>
           </a:p>
@@ -417,7 +417,7 @@
           <a:p>
             <a:fld id="{39636A98-17E3-2D40-AC23-AD56D5C9F209}" type="datetimeFigureOut">
               <a:rPr lang="en-US" smtClean="0"/>
-              <a:t>9/9/16</a:t>
+              <a:t>9/10/16</a:t>
             </a:fld>
             <a:endParaRPr lang="en-US"/>
           </a:p>
@@ -1033,10 +1033,6 @@
           <a:bodyPr/>
           <a:lstStyle/>
           <a:p>
-            <a:fld id="{3777BB69-1B21-CF4A-9B98-4646B2CAB2C7}" type="datetime1">
-              <a:rPr lang="en-US" smtClean="0"/>
-              <a:t>9/9/16</a:t>
-            </a:fld>
             <a:endParaRPr lang="en-US"/>
           </a:p>
         </p:txBody>
@@ -1058,7 +1054,7 @@
           <a:p>
             <a:r>
               <a:rPr lang="de-DE" smtClean="0"/>
-              <a:t>PennApps Ruby Workshop</a:t>
+              <a:t>All slides can be found at pennapps-ruby-workshop.herokuapp.com</a:t>
             </a:r>
             <a:endParaRPr lang="en-US"/>
           </a:p>
@@ -1207,10 +1203,6 @@
           <a:bodyPr/>
           <a:lstStyle/>
           <a:p>
-            <a:fld id="{0010CDE3-5BF5-7140-BA9D-B1A26FB597B4}" type="datetime1">
-              <a:rPr lang="en-US" smtClean="0"/>
-              <a:t>9/9/16</a:t>
-            </a:fld>
             <a:endParaRPr lang="en-US"/>
           </a:p>
         </p:txBody>
@@ -1232,7 +1224,7 @@
           <a:p>
             <a:r>
               <a:rPr lang="de-DE" smtClean="0"/>
-              <a:t>PennApps Ruby Workshop</a:t>
+              <a:t>All slides can be found at pennapps-ruby-workshop.herokuapp.com</a:t>
             </a:r>
             <a:endParaRPr lang="en-US"/>
           </a:p>
@@ -1391,10 +1383,6 @@
           <a:bodyPr/>
           <a:lstStyle/>
           <a:p>
-            <a:fld id="{BC18B3F1-5D49-1A48-AE82-E2C3BE9F2E9A}" type="datetime1">
-              <a:rPr lang="en-US" smtClean="0"/>
-              <a:t>9/9/16</a:t>
-            </a:fld>
             <a:endParaRPr lang="en-US"/>
           </a:p>
         </p:txBody>
@@ -1416,7 +1404,7 @@
           <a:p>
             <a:r>
               <a:rPr lang="de-DE" smtClean="0"/>
-              <a:t>PennApps Ruby Workshop</a:t>
+              <a:t>All slides can be found at pennapps-ruby-workshop.herokuapp.com</a:t>
             </a:r>
             <a:endParaRPr lang="en-US"/>
           </a:p>
@@ -1552,52 +1540,34 @@
       </p:sp>
       <p:sp>
         <p:nvSpPr>
-          <p:cNvPr id="4" name="Date Placeholder 3"/>
-          <p:cNvSpPr>
-            <a:spLocks noGrp="1"/>
-          </p:cNvSpPr>
-          <p:nvPr>
-            <p:ph type="dt" sz="half" idx="10"/>
-          </p:nvPr>
-        </p:nvSpPr>
-        <p:spPr/>
-        <p:txBody>
-          <a:bodyPr/>
-          <a:lstStyle/>
-          <a:p>
-            <a:fld id="{E13B6885-4DEF-1F4E-81AA-085F131E92BA}" type="datetime1">
-              <a:rPr lang="en-US" smtClean="0"/>
-              <a:t>9/9/16</a:t>
-            </a:fld>
+          <p:cNvPr id="5" name="Footer Placeholder 4"/>
+          <p:cNvSpPr>
+            <a:spLocks noGrp="1"/>
+          </p:cNvSpPr>
+          <p:nvPr>
+            <p:ph type="ftr" sz="quarter" idx="11"/>
+          </p:nvPr>
+        </p:nvSpPr>
+        <p:spPr>
+          <a:xfrm>
+            <a:off x="2125980" y="6356350"/>
+            <a:ext cx="4892040" cy="365125"/>
+          </a:xfrm>
+        </p:spPr>
+        <p:txBody>
+          <a:bodyPr/>
+          <a:lstStyle/>
+          <a:p>
+            <a:r>
+              <a:rPr lang="de-DE" smtClean="0"/>
+              <a:t>All slides can be found at pennapps-ruby-workshop.herokuapp.com</a:t>
+            </a:r>
             <a:endParaRPr lang="en-US"/>
           </a:p>
         </p:txBody>
       </p:sp>
       <p:sp>
         <p:nvSpPr>
-          <p:cNvPr id="5" name="Footer Placeholder 4"/>
-          <p:cNvSpPr>
-            <a:spLocks noGrp="1"/>
-          </p:cNvSpPr>
-          <p:nvPr>
-            <p:ph type="ftr" sz="quarter" idx="11"/>
-          </p:nvPr>
-        </p:nvSpPr>
-        <p:spPr/>
-        <p:txBody>
-          <a:bodyPr/>
-          <a:lstStyle/>
-          <a:p>
-            <a:r>
-              <a:rPr lang="de-DE" smtClean="0"/>
-              <a:t>PennApps Ruby Workshop</a:t>
-            </a:r>
-            <a:endParaRPr lang="en-US"/>
-          </a:p>
-        </p:txBody>
-      </p:sp>
-      <p:sp>
-        <p:nvSpPr>
           <p:cNvPr id="6" name="Slide Number Placeholder 5"/>
           <p:cNvSpPr>
             <a:spLocks noGrp="1"/>
@@ -1606,7 +1576,12 @@
             <p:ph type="sldNum" sz="quarter" idx="12"/>
           </p:nvPr>
         </p:nvSpPr>
-        <p:spPr/>
+        <p:spPr>
+          <a:xfrm>
+            <a:off x="8174736" y="6356350"/>
+            <a:ext cx="512064" cy="365125"/>
+          </a:xfrm>
+        </p:spPr>
         <p:txBody>
           <a:bodyPr/>
           <a:lstStyle/>
@@ -1815,10 +1790,6 @@
           <a:bodyPr/>
           <a:lstStyle/>
           <a:p>
-            <a:fld id="{3BD7186A-33CB-2944-A1A7-D86B4862D171}" type="datetime1">
-              <a:rPr lang="en-US" smtClean="0"/>
-              <a:t>9/9/16</a:t>
-            </a:fld>
             <a:endParaRPr lang="en-US"/>
           </a:p>
         </p:txBody>
@@ -1840,7 +1811,7 @@
           <a:p>
             <a:r>
               <a:rPr lang="de-DE" smtClean="0"/>
-              <a:t>PennApps Ruby Workshop</a:t>
+              <a:t>All slides can be found at pennapps-ruby-workshop.herokuapp.com</a:t>
             </a:r>
             <a:endParaRPr lang="en-US"/>
           </a:p>
@@ -2107,10 +2078,6 @@
           <a:bodyPr/>
           <a:lstStyle/>
           <a:p>
-            <a:fld id="{C8EC4B96-31B4-F242-8C61-F7FE8661C9B1}" type="datetime1">
-              <a:rPr lang="en-US" smtClean="0"/>
-              <a:t>9/9/16</a:t>
-            </a:fld>
             <a:endParaRPr lang="en-US"/>
           </a:p>
         </p:txBody>
@@ -2132,7 +2099,7 @@
           <a:p>
             <a:r>
               <a:rPr lang="de-DE" smtClean="0"/>
-              <a:t>PennApps Ruby Workshop</a:t>
+              <a:t>All slides can be found at pennapps-ruby-workshop.herokuapp.com</a:t>
             </a:r>
             <a:endParaRPr lang="en-US"/>
           </a:p>
@@ -2533,10 +2500,6 @@
           <a:bodyPr/>
           <a:lstStyle/>
           <a:p>
-            <a:fld id="{6EC9130F-EBAA-4A49-9F49-200AD6F74581}" type="datetime1">
-              <a:rPr lang="en-US" smtClean="0"/>
-              <a:t>9/9/16</a:t>
-            </a:fld>
             <a:endParaRPr lang="en-US"/>
           </a:p>
         </p:txBody>
@@ -2558,7 +2521,7 @@
           <a:p>
             <a:r>
               <a:rPr lang="de-DE" smtClean="0"/>
-              <a:t>PennApps Ruby Workshop</a:t>
+              <a:t>All slides can be found at pennapps-ruby-workshop.herokuapp.com</a:t>
             </a:r>
             <a:endParaRPr lang="en-US"/>
           </a:p>
@@ -2655,10 +2618,6 @@
           <a:bodyPr/>
           <a:lstStyle/>
           <a:p>
-            <a:fld id="{36036F16-00FC-174E-AD37-9BE195525A11}" type="datetime1">
-              <a:rPr lang="en-US" smtClean="0"/>
-              <a:t>9/9/16</a:t>
-            </a:fld>
             <a:endParaRPr lang="en-US"/>
           </a:p>
         </p:txBody>
@@ -2680,7 +2639,7 @@
           <a:p>
             <a:r>
               <a:rPr lang="de-DE" smtClean="0"/>
-              <a:t>PennApps Ruby Workshop</a:t>
+              <a:t>All slides can be found at pennapps-ruby-workshop.herokuapp.com</a:t>
             </a:r>
             <a:endParaRPr lang="en-US"/>
           </a:p>
@@ -2754,10 +2713,6 @@
           <a:bodyPr/>
           <a:lstStyle/>
           <a:p>
-            <a:fld id="{487407DB-422C-214A-8080-09334DE0FCB0}" type="datetime1">
-              <a:rPr lang="en-US" smtClean="0"/>
-              <a:t>9/9/16</a:t>
-            </a:fld>
             <a:endParaRPr lang="en-US"/>
           </a:p>
         </p:txBody>
@@ -2779,7 +2734,7 @@
           <a:p>
             <a:r>
               <a:rPr lang="de-DE" smtClean="0"/>
-              <a:t>PennApps Ruby Workshop</a:t>
+              <a:t>All slides can be found at pennapps-ruby-workshop.herokuapp.com</a:t>
             </a:r>
             <a:endParaRPr lang="en-US"/>
           </a:p>
@@ -3035,10 +2990,6 @@
           <a:bodyPr/>
           <a:lstStyle/>
           <a:p>
-            <a:fld id="{22B06FB9-3A7B-8647-BC83-2222D7F915FE}" type="datetime1">
-              <a:rPr lang="en-US" smtClean="0"/>
-              <a:t>9/9/16</a:t>
-            </a:fld>
             <a:endParaRPr lang="en-US"/>
           </a:p>
         </p:txBody>
@@ -3060,7 +3011,7 @@
           <a:p>
             <a:r>
               <a:rPr lang="de-DE" smtClean="0"/>
-              <a:t>PennApps Ruby Workshop</a:t>
+              <a:t>All slides can be found at pennapps-ruby-workshop.herokuapp.com</a:t>
             </a:r>
             <a:endParaRPr lang="en-US"/>
           </a:p>
@@ -3296,10 +3247,6 @@
           <a:bodyPr/>
           <a:lstStyle/>
           <a:p>
-            <a:fld id="{24876213-DC0D-BE44-A06E-AE4DF4969AF2}" type="datetime1">
-              <a:rPr lang="en-US" smtClean="0"/>
-              <a:t>9/9/16</a:t>
-            </a:fld>
             <a:endParaRPr lang="en-US"/>
           </a:p>
         </p:txBody>
@@ -3321,7 +3268,7 @@
           <a:p>
             <a:r>
               <a:rPr lang="de-DE" smtClean="0"/>
-              <a:t>PennApps Ruby Workshop</a:t>
+              <a:t>All slides can be found at pennapps-ruby-workshop.herokuapp.com</a:t>
             </a:r>
             <a:endParaRPr lang="en-US"/>
           </a:p>
@@ -3513,10 +3460,6 @@
             </a:lvl1pPr>
           </a:lstStyle>
           <a:p>
-            <a:fld id="{539F888F-FA39-9C45-890B-9BD9FABFF8DF}" type="datetime1">
-              <a:rPr lang="en-US" smtClean="0"/>
-              <a:t>9/9/16</a:t>
-            </a:fld>
             <a:endParaRPr lang="en-US"/>
           </a:p>
         </p:txBody>
@@ -3556,7 +3499,7 @@
           <a:p>
             <a:r>
               <a:rPr lang="de-DE" smtClean="0"/>
-              <a:t>PennApps Ruby Workshop</a:t>
+              <a:t>All slides can be found at pennapps-ruby-workshop.herokuapp.com</a:t>
             </a:r>
             <a:endParaRPr lang="en-US"/>
           </a:p>
@@ -4006,14 +3949,55 @@
             <p:ph type="ftr" sz="quarter" idx="11"/>
           </p:nvPr>
         </p:nvSpPr>
-        <p:spPr/>
-        <p:txBody>
-          <a:bodyPr/>
-          <a:lstStyle/>
-          <a:p>
-            <a:r>
-              <a:rPr lang="de-DE" smtClean="0"/>
-              <a:t>PennApps Ruby Workshop</a:t>
+        <p:spPr>
+          <a:xfrm>
+            <a:off x="1833372" y="6356350"/>
+            <a:ext cx="5477256" cy="365125"/>
+          </a:xfrm>
+        </p:spPr>
+        <p:txBody>
+          <a:bodyPr/>
+          <a:lstStyle/>
+          <a:p>
+            <a:r>
+              <a:rPr lang="de-DE" dirty="0" smtClean="0"/>
+              <a:t>All </a:t>
+            </a:r>
+            <a:r>
+              <a:rPr lang="de-DE" dirty="0" err="1" smtClean="0"/>
+              <a:t>slides</a:t>
+            </a:r>
+            <a:r>
+              <a:rPr lang="de-DE" dirty="0" smtClean="0"/>
+              <a:t> </a:t>
+            </a:r>
+            <a:r>
+              <a:rPr lang="de-DE" dirty="0" err="1" smtClean="0"/>
+              <a:t>can</a:t>
+            </a:r>
+            <a:r>
+              <a:rPr lang="de-DE" dirty="0" smtClean="0"/>
+              <a:t> </a:t>
+            </a:r>
+            <a:r>
+              <a:rPr lang="de-DE" dirty="0" err="1" smtClean="0"/>
+              <a:t>be</a:t>
+            </a:r>
+            <a:r>
+              <a:rPr lang="de-DE" dirty="0" smtClean="0"/>
+              <a:t> </a:t>
+            </a:r>
+            <a:r>
+              <a:rPr lang="de-DE" dirty="0" err="1" smtClean="0"/>
+              <a:t>found</a:t>
+            </a:r>
+            <a:r>
+              <a:rPr lang="de-DE" dirty="0" smtClean="0"/>
+              <a:t> at </a:t>
+            </a:r>
+            <a:r>
+              <a:rPr lang="de-DE" dirty="0" err="1" smtClean="0"/>
+              <a:t>pennapps-ruby-workshop.herokuapp.com</a:t>
             </a:r>
             <a:endParaRPr lang="en-US" dirty="0"/>
           </a:p>
@@ -4029,7 +4013,12 @@
             <p:ph type="sldNum" sz="quarter" idx="12"/>
           </p:nvPr>
         </p:nvSpPr>
-        <p:spPr/>
+        <p:spPr>
+          <a:xfrm>
+            <a:off x="8302752" y="6356350"/>
+            <a:ext cx="384048" cy="365125"/>
+          </a:xfrm>
+        </p:spPr>
         <p:txBody>
           <a:bodyPr/>
           <a:lstStyle/>
@@ -4038,7 +4027,7 @@
               <a:rPr lang="en-US" smtClean="0"/>
               <a:t>1</a:t>
             </a:fld>
-            <a:endParaRPr lang="en-US"/>
+            <a:endParaRPr lang="en-US" dirty="0"/>
           </a:p>
         </p:txBody>
       </p:sp>
@@ -4162,7 +4151,7 @@
           <a:p>
             <a:r>
               <a:rPr lang="de-DE" smtClean="0"/>
-              <a:t>PennApps Ruby Workshop</a:t>
+              <a:t>All slides can be found at pennapps-ruby-workshop.herokuapp.com</a:t>
             </a:r>
             <a:endParaRPr lang="en-US"/>
           </a:p>
@@ -4723,7 +4712,7 @@
           <a:p>
             <a:r>
               <a:rPr lang="de-DE" smtClean="0"/>
-              <a:t>PennApps Ruby Workshop</a:t>
+              <a:t>All slides can be found at pennapps-ruby-workshop.herokuapp.com</a:t>
             </a:r>
             <a:endParaRPr lang="en-US"/>
           </a:p>
@@ -5199,7 +5188,7 @@
           <a:p>
             <a:r>
               <a:rPr lang="de-DE" smtClean="0"/>
-              <a:t>PennApps Ruby Workshop</a:t>
+              <a:t>All slides can be found at pennapps-ruby-workshop.herokuapp.com</a:t>
             </a:r>
             <a:endParaRPr lang="en-US"/>
           </a:p>
@@ -5740,7 +5729,7 @@
           <a:p>
             <a:r>
               <a:rPr lang="de-DE" smtClean="0"/>
-              <a:t>PennApps Ruby Workshop</a:t>
+              <a:t>All slides can be found at pennapps-ruby-workshop.herokuapp.com</a:t>
             </a:r>
             <a:endParaRPr lang="en-US"/>
           </a:p>
@@ -5856,7 +5845,7 @@
           <a:p>
             <a:r>
               <a:rPr lang="de-DE" smtClean="0"/>
-              <a:t>PennApps Ruby Workshop</a:t>
+              <a:t>All slides can be found at pennapps-ruby-workshop.herokuapp.com</a:t>
             </a:r>
             <a:endParaRPr lang="en-US"/>
           </a:p>
@@ -6092,7 +6081,7 @@
           <a:p>
             <a:r>
               <a:rPr lang="de-DE" smtClean="0"/>
-              <a:t>PennApps Ruby Workshop</a:t>
+              <a:t>All slides can be found at pennapps-ruby-workshop.herokuapp.com</a:t>
             </a:r>
             <a:endParaRPr lang="en-US"/>
           </a:p>
@@ -6498,7 +6487,7 @@
           <a:p>
             <a:r>
               <a:rPr lang="de-DE" smtClean="0"/>
-              <a:t>PennApps Ruby Workshop</a:t>
+              <a:t>All slides can be found at pennapps-ruby-workshop.herokuapp.com</a:t>
             </a:r>
             <a:endParaRPr lang="en-US"/>
           </a:p>
@@ -6685,7 +6674,7 @@
           <a:p>
             <a:r>
               <a:rPr lang="de-DE" smtClean="0"/>
-              <a:t>PennApps Ruby Workshop</a:t>
+              <a:t>All slides can be found at pennapps-ruby-workshop.herokuapp.com</a:t>
             </a:r>
             <a:endParaRPr lang="en-US"/>
           </a:p>
@@ -7023,7 +7012,7 @@
           <a:p>
             <a:r>
               <a:rPr lang="de-DE" smtClean="0"/>
-              <a:t>PennApps Ruby Workshop</a:t>
+              <a:t>All slides can be found at pennapps-ruby-workshop.herokuapp.com</a:t>
             </a:r>
             <a:endParaRPr lang="en-US"/>
           </a:p>
@@ -7234,7 +7223,7 @@
           <a:p>
             <a:r>
               <a:rPr lang="de-DE" smtClean="0"/>
-              <a:t>PennApps Ruby Workshop</a:t>
+              <a:t>All slides can be found at pennapps-ruby-workshop.herokuapp.com</a:t>
             </a:r>
             <a:endParaRPr lang="en-US"/>
           </a:p>
@@ -7531,7 +7520,7 @@
           <a:p>
             <a:r>
               <a:rPr lang="de-DE" smtClean="0"/>
-              <a:t>PennApps Ruby Workshop</a:t>
+              <a:t>All slides can be found at pennapps-ruby-workshop.herokuapp.com</a:t>
             </a:r>
             <a:endParaRPr lang="en-US"/>
           </a:p>
@@ -7798,7 +7787,7 @@
           <a:p>
             <a:r>
               <a:rPr lang="de-DE" smtClean="0"/>
-              <a:t>PennApps Ruby Workshop</a:t>
+              <a:t>All slides can be found at pennapps-ruby-workshop.herokuapp.com</a:t>
             </a:r>
             <a:endParaRPr lang="en-US"/>
           </a:p>
@@ -7972,7 +7961,7 @@
           <a:p>
             <a:r>
               <a:rPr lang="de-DE" smtClean="0"/>
-              <a:t>PennApps Ruby Workshop</a:t>
+              <a:t>All slides can be found at pennapps-ruby-workshop.herokuapp.com</a:t>
             </a:r>
             <a:endParaRPr lang="en-US"/>
           </a:p>
@@ -8260,7 +8249,7 @@
           <a:p>
             <a:r>
               <a:rPr lang="de-DE" smtClean="0"/>
-              <a:t>PennApps Ruby Workshop</a:t>
+              <a:t>All slides can be found at pennapps-ruby-workshop.herokuapp.com</a:t>
             </a:r>
             <a:endParaRPr lang="en-US"/>
           </a:p>
@@ -8593,7 +8582,7 @@
           <a:p>
             <a:r>
               <a:rPr lang="de-DE" smtClean="0"/>
-              <a:t>PennApps Ruby Workshop</a:t>
+              <a:t>All slides can be found at pennapps-ruby-workshop.herokuapp.com</a:t>
             </a:r>
             <a:endParaRPr lang="en-US"/>
           </a:p>
@@ -8799,7 +8788,7 @@
           <a:p>
             <a:r>
               <a:rPr lang="de-DE" smtClean="0"/>
-              <a:t>PennApps Ruby Workshop</a:t>
+              <a:t>All slides can be found at pennapps-ruby-workshop.herokuapp.com</a:t>
             </a:r>
             <a:endParaRPr lang="en-US"/>
           </a:p>
@@ -9132,7 +9121,7 @@
           <a:p>
             <a:r>
               <a:rPr lang="de-DE" smtClean="0"/>
-              <a:t>PennApps Ruby Workshop</a:t>
+              <a:t>All slides can be found at pennapps-ruby-workshop.herokuapp.com</a:t>
             </a:r>
             <a:endParaRPr lang="en-US"/>
           </a:p>
@@ -9316,7 +9305,7 @@
           <a:p>
             <a:r>
               <a:rPr lang="de-DE" smtClean="0"/>
-              <a:t>PennApps Ruby Workshop</a:t>
+              <a:t>All slides can be found at pennapps-ruby-workshop.herokuapp.com</a:t>
             </a:r>
             <a:endParaRPr lang="en-US"/>
           </a:p>
@@ -9520,7 +9509,7 @@
           <a:p>
             <a:r>
               <a:rPr lang="de-DE" smtClean="0"/>
-              <a:t>PennApps Ruby Workshop</a:t>
+              <a:t>All slides can be found at pennapps-ruby-workshop.herokuapp.com</a:t>
             </a:r>
             <a:endParaRPr lang="en-US"/>
           </a:p>
@@ -9728,7 +9717,7 @@
           <a:p>
             <a:r>
               <a:rPr lang="de-DE" smtClean="0"/>
-              <a:t>PennApps Ruby Workshop</a:t>
+              <a:t>All slides can be found at pennapps-ruby-workshop.herokuapp.com</a:t>
             </a:r>
             <a:endParaRPr lang="en-US"/>
           </a:p>
@@ -10387,7 +10376,7 @@
           <a:p>
             <a:r>
               <a:rPr lang="de-DE" smtClean="0"/>
-              <a:t>PennApps Ruby Workshop</a:t>
+              <a:t>All slides can be found at pennapps-ruby-workshop.herokuapp.com</a:t>
             </a:r>
             <a:endParaRPr lang="en-US"/>
           </a:p>
@@ -10566,7 +10555,7 @@
           <a:p>
             <a:r>
               <a:rPr lang="de-DE" smtClean="0"/>
-              <a:t>PennApps Ruby Workshop</a:t>
+              <a:t>All slides can be found at pennapps-ruby-workshop.herokuapp.com</a:t>
             </a:r>
             <a:endParaRPr lang="en-US"/>
           </a:p>
@@ -11030,7 +11019,7 @@
           <a:p>
             <a:r>
               <a:rPr lang="de-DE" smtClean="0"/>
-              <a:t>PennApps Ruby Workshop</a:t>
+              <a:t>All slides can be found at pennapps-ruby-workshop.herokuapp.com</a:t>
             </a:r>
             <a:endParaRPr lang="en-US"/>
           </a:p>
@@ -11280,7 +11269,7 @@
           <a:p>
             <a:r>
               <a:rPr lang="de-DE" smtClean="0"/>
-              <a:t>PennApps Ruby Workshop</a:t>
+              <a:t>All slides can be found at pennapps-ruby-workshop.herokuapp.com</a:t>
             </a:r>
             <a:endParaRPr lang="en-US"/>
           </a:p>
@@ -11681,7 +11670,7 @@
           <a:p>
             <a:r>
               <a:rPr lang="de-DE" smtClean="0"/>
-              <a:t>PennApps Ruby Workshop</a:t>
+              <a:t>All slides can be found at pennapps-ruby-workshop.herokuapp.com</a:t>
             </a:r>
             <a:endParaRPr lang="en-US"/>
           </a:p>
@@ -12031,7 +12020,7 @@
           <a:p>
             <a:r>
               <a:rPr lang="de-DE" smtClean="0"/>
-              <a:t>PennApps Ruby Workshop</a:t>
+              <a:t>All slides can be found at pennapps-ruby-workshop.herokuapp.com</a:t>
             </a:r>
             <a:endParaRPr lang="en-US"/>
           </a:p>
@@ -12606,7 +12595,7 @@
           <a:p>
             <a:r>
               <a:rPr lang="de-DE" smtClean="0"/>
-              <a:t>PennApps Ruby Workshop</a:t>
+              <a:t>All slides can be found at pennapps-ruby-workshop.herokuapp.com</a:t>
             </a:r>
             <a:endParaRPr lang="en-US"/>
           </a:p>
@@ -13000,7 +12989,7 @@
           <a:p>
             <a:r>
               <a:rPr lang="de-DE" smtClean="0"/>
-              <a:t>PennApps Ruby Workshop</a:t>
+              <a:t>All slides can be found at pennapps-ruby-workshop.herokuapp.com</a:t>
             </a:r>
             <a:endParaRPr lang="en-US"/>
           </a:p>
@@ -13449,7 +13438,7 @@
           <a:p>
             <a:r>
               <a:rPr lang="de-DE" smtClean="0"/>
-              <a:t>PennApps Ruby Workshop</a:t>
+              <a:t>All slides can be found at pennapps-ruby-workshop.herokuapp.com</a:t>
             </a:r>
             <a:endParaRPr lang="en-US"/>
           </a:p>
@@ -13858,7 +13847,7 @@
           <a:p>
             <a:r>
               <a:rPr lang="de-DE" smtClean="0"/>
-              <a:t>PennApps Ruby Workshop</a:t>
+              <a:t>All slides can be found at pennapps-ruby-workshop.herokuapp.com</a:t>
             </a:r>
             <a:endParaRPr lang="en-US"/>
           </a:p>
@@ -14215,7 +14204,7 @@
           <a:p>
             <a:r>
               <a:rPr lang="de-DE" smtClean="0"/>
-              <a:t>PennApps Ruby Workshop</a:t>
+              <a:t>All slides can be found at pennapps-ruby-workshop.herokuapp.com</a:t>
             </a:r>
             <a:endParaRPr lang="en-US"/>
           </a:p>
@@ -14400,7 +14389,7 @@
           <a:p>
             <a:r>
               <a:rPr lang="de-DE" smtClean="0"/>
-              <a:t>PennApps Ruby Workshop</a:t>
+              <a:t>All slides can be found at pennapps-ruby-workshop.herokuapp.com</a:t>
             </a:r>
             <a:endParaRPr lang="en-US"/>
           </a:p>
@@ -14720,7 +14709,7 @@
           <a:p>
             <a:r>
               <a:rPr lang="de-DE" smtClean="0"/>
-              <a:t>PennApps Ruby Workshop</a:t>
+              <a:t>All slides can be found at pennapps-ruby-workshop.herokuapp.com</a:t>
             </a:r>
             <a:endParaRPr lang="en-US"/>
           </a:p>
@@ -15009,7 +14998,7 @@
           <a:p>
             <a:r>
               <a:rPr lang="de-DE" smtClean="0"/>
-              <a:t>PennApps Ruby Workshop</a:t>
+              <a:t>All slides can be found at pennapps-ruby-workshop.herokuapp.com</a:t>
             </a:r>
             <a:endParaRPr lang="en-US"/>
           </a:p>
@@ -15551,7 +15540,7 @@
           <a:p>
             <a:r>
               <a:rPr lang="de-DE" smtClean="0"/>
-              <a:t>PennApps Ruby Workshop</a:t>
+              <a:t>All slides can be found at pennapps-ruby-workshop.herokuapp.com</a:t>
             </a:r>
             <a:endParaRPr lang="en-US"/>
           </a:p>
@@ -15962,7 +15951,7 @@
           <a:p>
             <a:r>
               <a:rPr lang="de-DE" smtClean="0"/>
-              <a:t>PennApps Ruby Workshop</a:t>
+              <a:t>All slides can be found at pennapps-ruby-workshop.herokuapp.com</a:t>
             </a:r>
             <a:endParaRPr lang="en-US"/>
           </a:p>
@@ -16258,7 +16247,7 @@
           <a:p>
             <a:r>
               <a:rPr lang="de-DE" smtClean="0"/>
-              <a:t>PennApps Ruby Workshop</a:t>
+              <a:t>All slides can be found at pennapps-ruby-workshop.herokuapp.com</a:t>
             </a:r>
             <a:endParaRPr lang="en-US"/>
           </a:p>
@@ -16799,7 +16788,7 @@
           <a:p>
             <a:r>
               <a:rPr lang="de-DE" smtClean="0"/>
-              <a:t>PennApps Ruby Workshop</a:t>
+              <a:t>All slides can be found at pennapps-ruby-workshop.herokuapp.com</a:t>
             </a:r>
             <a:endParaRPr lang="en-US"/>
           </a:p>
@@ -16960,7 +16949,7 @@
           <a:p>
             <a:r>
               <a:rPr lang="de-DE" smtClean="0"/>
-              <a:t>PennApps Ruby Workshop</a:t>
+              <a:t>All slides can be found at pennapps-ruby-workshop.herokuapp.com</a:t>
             </a:r>
             <a:endParaRPr lang="en-US"/>
           </a:p>
@@ -17554,7 +17543,7 @@
           <a:p>
             <a:r>
               <a:rPr lang="de-DE" smtClean="0"/>
-              <a:t>PennApps Ruby Workshop</a:t>
+              <a:t>All slides can be found at pennapps-ruby-workshop.herokuapp.com</a:t>
             </a:r>
             <a:endParaRPr lang="en-US"/>
           </a:p>

</xml_diff>

<commit_message>
add animation to post request slide and add demo to .gitignore
</commit_message>
<xml_diff>
--- a/pennapps-ruby-workshop.pptx
+++ b/pennapps-ruby-workshop.pptx
@@ -7054,7 +7054,159 @@
   <p:timing>
     <p:tnLst>
       <p:par>
-        <p:cTn id="1" dur="indefinite" restart="never" nodeType="tmRoot"/>
+        <p:cTn id="1" dur="indefinite" restart="never" nodeType="tmRoot">
+          <p:childTnLst>
+            <p:seq concurrent="1" nextAc="seek">
+              <p:cTn id="2" dur="indefinite" nodeType="mainSeq">
+                <p:childTnLst>
+                  <p:par>
+                    <p:cTn id="3" fill="hold">
+                      <p:stCondLst>
+                        <p:cond delay="indefinite"/>
+                      </p:stCondLst>
+                      <p:childTnLst>
+                        <p:par>
+                          <p:cTn id="4" fill="hold">
+                            <p:stCondLst>
+                              <p:cond delay="0"/>
+                            </p:stCondLst>
+                            <p:childTnLst>
+                              <p:par>
+                                <p:cTn id="5" presetID="1" presetClass="entr" presetSubtype="0" fill="hold" nodeType="clickEffect">
+                                  <p:stCondLst>
+                                    <p:cond delay="0"/>
+                                  </p:stCondLst>
+                                  <p:childTnLst>
+                                    <p:set>
+                                      <p:cBhvr>
+                                        <p:cTn id="6" dur="1" fill="hold">
+                                          <p:stCondLst>
+                                            <p:cond delay="0"/>
+                                          </p:stCondLst>
+                                        </p:cTn>
+                                        <p:tgtEl>
+                                          <p:spTgt spid="3">
+                                            <p:txEl>
+                                              <p:pRg st="1" end="1"/>
+                                            </p:txEl>
+                                          </p:spTgt>
+                                        </p:tgtEl>
+                                        <p:attrNameLst>
+                                          <p:attrName>style.visibility</p:attrName>
+                                        </p:attrNameLst>
+                                      </p:cBhvr>
+                                      <p:to>
+                                        <p:strVal val="visible"/>
+                                      </p:to>
+                                    </p:set>
+                                  </p:childTnLst>
+                                </p:cTn>
+                              </p:par>
+                              <p:par>
+                                <p:cTn id="7" presetID="1" presetClass="entr" presetSubtype="0" fill="hold" nodeType="withEffect">
+                                  <p:stCondLst>
+                                    <p:cond delay="0"/>
+                                  </p:stCondLst>
+                                  <p:childTnLst>
+                                    <p:set>
+                                      <p:cBhvr>
+                                        <p:cTn id="8" dur="1" fill="hold">
+                                          <p:stCondLst>
+                                            <p:cond delay="0"/>
+                                          </p:stCondLst>
+                                        </p:cTn>
+                                        <p:tgtEl>
+                                          <p:spTgt spid="3">
+                                            <p:txEl>
+                                              <p:pRg st="2" end="2"/>
+                                            </p:txEl>
+                                          </p:spTgt>
+                                        </p:tgtEl>
+                                        <p:attrNameLst>
+                                          <p:attrName>style.visibility</p:attrName>
+                                        </p:attrNameLst>
+                                      </p:cBhvr>
+                                      <p:to>
+                                        <p:strVal val="visible"/>
+                                      </p:to>
+                                    </p:set>
+                                  </p:childTnLst>
+                                </p:cTn>
+                              </p:par>
+                            </p:childTnLst>
+                          </p:cTn>
+                        </p:par>
+                      </p:childTnLst>
+                    </p:cTn>
+                  </p:par>
+                  <p:par>
+                    <p:cTn id="9" fill="hold">
+                      <p:stCondLst>
+                        <p:cond delay="indefinite"/>
+                      </p:stCondLst>
+                      <p:childTnLst>
+                        <p:par>
+                          <p:cTn id="10" fill="hold">
+                            <p:stCondLst>
+                              <p:cond delay="0"/>
+                            </p:stCondLst>
+                            <p:childTnLst>
+                              <p:par>
+                                <p:cTn id="11" presetID="1" presetClass="entr" presetSubtype="0" fill="hold" nodeType="clickEffect">
+                                  <p:stCondLst>
+                                    <p:cond delay="0"/>
+                                  </p:stCondLst>
+                                  <p:childTnLst>
+                                    <p:set>
+                                      <p:cBhvr>
+                                        <p:cTn id="12" dur="1" fill="hold">
+                                          <p:stCondLst>
+                                            <p:cond delay="0"/>
+                                          </p:stCondLst>
+                                        </p:cTn>
+                                        <p:tgtEl>
+                                          <p:spTgt spid="3">
+                                            <p:txEl>
+                                              <p:pRg st="3" end="3"/>
+                                            </p:txEl>
+                                          </p:spTgt>
+                                        </p:tgtEl>
+                                        <p:attrNameLst>
+                                          <p:attrName>style.visibility</p:attrName>
+                                        </p:attrNameLst>
+                                      </p:cBhvr>
+                                      <p:to>
+                                        <p:strVal val="visible"/>
+                                      </p:to>
+                                    </p:set>
+                                  </p:childTnLst>
+                                </p:cTn>
+                              </p:par>
+                            </p:childTnLst>
+                          </p:cTn>
+                        </p:par>
+                      </p:childTnLst>
+                    </p:cTn>
+                  </p:par>
+                </p:childTnLst>
+              </p:cTn>
+              <p:prevCondLst>
+                <p:cond evt="onPrev" delay="0">
+                  <p:tgtEl>
+                    <p:sldTgt/>
+                  </p:tgtEl>
+                </p:cond>
+              </p:prevCondLst>
+              <p:nextCondLst>
+                <p:cond evt="onNext" delay="0">
+                  <p:tgtEl>
+                    <p:sldTgt/>
+                  </p:tgtEl>
+                </p:cond>
+              </p:nextCondLst>
+            </p:seq>
+          </p:childTnLst>
+        </p:cTn>
       </p:par>
     </p:tnLst>
   </p:timing>
@@ -7829,7 +7981,79 @@
   <p:timing>
     <p:tnLst>
       <p:par>
-        <p:cTn id="1" dur="indefinite" restart="never" nodeType="tmRoot"/>
+        <p:cTn id="1" dur="indefinite" restart="never" nodeType="tmRoot">
+          <p:childTnLst>
+            <p:seq concurrent="1" nextAc="seek">
+              <p:cTn id="2" dur="indefinite" nodeType="mainSeq">
+                <p:childTnLst>
+                  <p:par>
+                    <p:cTn id="3" fill="hold">
+                      <p:stCondLst>
+                        <p:cond delay="indefinite"/>
+                      </p:stCondLst>
+                      <p:childTnLst>
+                        <p:par>
+                          <p:cTn id="4" fill="hold">
+                            <p:stCondLst>
+                              <p:cond delay="0"/>
+                            </p:stCondLst>
+                            <p:childTnLst>
+                              <p:par>
+                                <p:cTn id="5" presetID="1" presetClass="entr" presetSubtype="0" fill="hold" nodeType="clickEffect">
+                                  <p:stCondLst>
+                                    <p:cond delay="0"/>
+                                  </p:stCondLst>
+                                  <p:childTnLst>
+                                    <p:set>
+                                      <p:cBhvr>
+                                        <p:cTn id="6" dur="1" fill="hold">
+                                          <p:stCondLst>
+                                            <p:cond delay="0"/>
+                                          </p:stCondLst>
+                                        </p:cTn>
+                                        <p:tgtEl>
+                                          <p:spTgt spid="3">
+                                            <p:txEl>
+                                              <p:pRg st="1" end="1"/>
+                                            </p:txEl>
+                                          </p:spTgt>
+                                        </p:tgtEl>
+                                        <p:attrNameLst>
+                                          <p:attrName>style.visibility</p:attrName>
+                                        </p:attrNameLst>
+                                      </p:cBhvr>
+                                      <p:to>
+                                        <p:strVal val="visible"/>
+                                      </p:to>
+                                    </p:set>
+                                  </p:childTnLst>
+                                </p:cTn>
+                              </p:par>
+                            </p:childTnLst>
+                          </p:cTn>
+                        </p:par>
+                      </p:childTnLst>
+                    </p:cTn>
+                  </p:par>
+                </p:childTnLst>
+              </p:cTn>
+              <p:prevCondLst>
+                <p:cond evt="onPrev" delay="0">
+                  <p:tgtEl>
+                    <p:sldTgt/>
+                  </p:tgtEl>
+                </p:cond>
+              </p:prevCondLst>
+              <p:nextCondLst>
+                <p:cond evt="onNext" delay="0">
+                  <p:tgtEl>
+                    <p:sldTgt/>
+                  </p:tgtEl>
+                </p:cond>
+              </p:nextCondLst>
+            </p:seq>
+          </p:childTnLst>
+        </p:cTn>
       </p:par>
     </p:tnLst>
   </p:timing>

</xml_diff>